<commit_message>
2021-03-09 1. 시연 영상 추가 2. sever 쪽 babel 설정 추가 3. ie11 에서 axios get, delete http method 제대로 동작하기 위한 no-cache 설정 4. ie11에서 크로스 부라우징 설정 (grid => flex로 변경, style 추가 및 변경, pollyfill 추가) 5. mainlogo 화면 너비에 따른 크기 변경 6. 금일 1등 작품에 1등 아이콘 추가
</commit_message>
<xml_diff>
--- a/밴치마킹.pptx
+++ b/밴치마킹.pptx
@@ -6,18 +6,16 @@
   </p:sldMasterIdLst>
   <p:sldIdLst>
     <p:sldId id="256" r:id="rId2"/>
-    <p:sldId id="257" r:id="rId3"/>
-    <p:sldId id="262" r:id="rId4"/>
-    <p:sldId id="269" r:id="rId5"/>
-    <p:sldId id="270" r:id="rId6"/>
-    <p:sldId id="261" r:id="rId7"/>
-    <p:sldId id="263" r:id="rId8"/>
-    <p:sldId id="259" r:id="rId9"/>
-    <p:sldId id="264" r:id="rId10"/>
-    <p:sldId id="265" r:id="rId11"/>
-    <p:sldId id="266" r:id="rId12"/>
-    <p:sldId id="267" r:id="rId13"/>
-    <p:sldId id="268" r:id="rId14"/>
+    <p:sldId id="269" r:id="rId3"/>
+    <p:sldId id="270" r:id="rId4"/>
+    <p:sldId id="261" r:id="rId5"/>
+    <p:sldId id="263" r:id="rId6"/>
+    <p:sldId id="259" r:id="rId7"/>
+    <p:sldId id="264" r:id="rId8"/>
+    <p:sldId id="265" r:id="rId9"/>
+    <p:sldId id="266" r:id="rId10"/>
+    <p:sldId id="267" r:id="rId11"/>
+    <p:sldId id="268" r:id="rId12"/>
   </p:sldIdLst>
   <p:sldSz cx="12192000" cy="6858000"/>
   <p:notesSz cx="6858000" cy="9144000"/>
@@ -116,6 +114,11 @@
       </a:defRPr>
     </a:lvl9pPr>
   </p:defaultTextStyle>
+  <p:extLst>
+    <p:ext uri="{EFAFB233-063F-42B5-8137-9DF3F51BA10A}">
+      <p15:sldGuideLst xmlns:p15="http://schemas.microsoft.com/office/powerpoint/2012/main"/>
+    </p:ext>
+  </p:extLst>
 </p:presentation>
 </file>
 
@@ -250,7 +253,7 @@
           <a:p>
             <a:fld id="{E96DD2F7-A262-4357-9948-8C01080B0461}" type="datetimeFigureOut">
               <a:rPr lang="ko-KR" altLang="en-US" smtClean="0"/>
-              <a:t>2020-12-19</a:t>
+              <a:t>2021-03-09</a:t>
             </a:fld>
             <a:endParaRPr lang="ko-KR" altLang="en-US"/>
           </a:p>
@@ -420,7 +423,7 @@
           <a:p>
             <a:fld id="{E96DD2F7-A262-4357-9948-8C01080B0461}" type="datetimeFigureOut">
               <a:rPr lang="ko-KR" altLang="en-US" smtClean="0"/>
-              <a:t>2020-12-19</a:t>
+              <a:t>2021-03-09</a:t>
             </a:fld>
             <a:endParaRPr lang="ko-KR" altLang="en-US"/>
           </a:p>
@@ -600,7 +603,7 @@
           <a:p>
             <a:fld id="{E96DD2F7-A262-4357-9948-8C01080B0461}" type="datetimeFigureOut">
               <a:rPr lang="ko-KR" altLang="en-US" smtClean="0"/>
-              <a:t>2020-12-19</a:t>
+              <a:t>2021-03-09</a:t>
             </a:fld>
             <a:endParaRPr lang="ko-KR" altLang="en-US"/>
           </a:p>
@@ -770,7 +773,7 @@
           <a:p>
             <a:fld id="{E96DD2F7-A262-4357-9948-8C01080B0461}" type="datetimeFigureOut">
               <a:rPr lang="ko-KR" altLang="en-US" smtClean="0"/>
-              <a:t>2020-12-19</a:t>
+              <a:t>2021-03-09</a:t>
             </a:fld>
             <a:endParaRPr lang="ko-KR" altLang="en-US"/>
           </a:p>
@@ -1016,7 +1019,7 @@
           <a:p>
             <a:fld id="{E96DD2F7-A262-4357-9948-8C01080B0461}" type="datetimeFigureOut">
               <a:rPr lang="ko-KR" altLang="en-US" smtClean="0"/>
-              <a:t>2020-12-19</a:t>
+              <a:t>2021-03-09</a:t>
             </a:fld>
             <a:endParaRPr lang="ko-KR" altLang="en-US"/>
           </a:p>
@@ -1248,7 +1251,7 @@
           <a:p>
             <a:fld id="{E96DD2F7-A262-4357-9948-8C01080B0461}" type="datetimeFigureOut">
               <a:rPr lang="ko-KR" altLang="en-US" smtClean="0"/>
-              <a:t>2020-12-19</a:t>
+              <a:t>2021-03-09</a:t>
             </a:fld>
             <a:endParaRPr lang="ko-KR" altLang="en-US"/>
           </a:p>
@@ -1615,7 +1618,7 @@
           <a:p>
             <a:fld id="{E96DD2F7-A262-4357-9948-8C01080B0461}" type="datetimeFigureOut">
               <a:rPr lang="ko-KR" altLang="en-US" smtClean="0"/>
-              <a:t>2020-12-19</a:t>
+              <a:t>2021-03-09</a:t>
             </a:fld>
             <a:endParaRPr lang="ko-KR" altLang="en-US"/>
           </a:p>
@@ -1733,7 +1736,7 @@
           <a:p>
             <a:fld id="{E96DD2F7-A262-4357-9948-8C01080B0461}" type="datetimeFigureOut">
               <a:rPr lang="ko-KR" altLang="en-US" smtClean="0"/>
-              <a:t>2020-12-19</a:t>
+              <a:t>2021-03-09</a:t>
             </a:fld>
             <a:endParaRPr lang="ko-KR" altLang="en-US"/>
           </a:p>
@@ -1828,7 +1831,7 @@
           <a:p>
             <a:fld id="{E96DD2F7-A262-4357-9948-8C01080B0461}" type="datetimeFigureOut">
               <a:rPr lang="ko-KR" altLang="en-US" smtClean="0"/>
-              <a:t>2020-12-19</a:t>
+              <a:t>2021-03-09</a:t>
             </a:fld>
             <a:endParaRPr lang="ko-KR" altLang="en-US"/>
           </a:p>
@@ -2105,7 +2108,7 @@
           <a:p>
             <a:fld id="{E96DD2F7-A262-4357-9948-8C01080B0461}" type="datetimeFigureOut">
               <a:rPr lang="ko-KR" altLang="en-US" smtClean="0"/>
-              <a:t>2020-12-19</a:t>
+              <a:t>2021-03-09</a:t>
             </a:fld>
             <a:endParaRPr lang="ko-KR" altLang="en-US"/>
           </a:p>
@@ -2358,7 +2361,7 @@
           <a:p>
             <a:fld id="{E96DD2F7-A262-4357-9948-8C01080B0461}" type="datetimeFigureOut">
               <a:rPr lang="ko-KR" altLang="en-US" smtClean="0"/>
-              <a:t>2020-12-19</a:t>
+              <a:t>2021-03-09</a:t>
             </a:fld>
             <a:endParaRPr lang="ko-KR" altLang="en-US"/>
           </a:p>
@@ -2571,7 +2574,7 @@
           <a:p>
             <a:fld id="{E96DD2F7-A262-4357-9948-8C01080B0461}" type="datetimeFigureOut">
               <a:rPr lang="ko-KR" altLang="en-US" smtClean="0"/>
-              <a:t>2020-12-19</a:t>
+              <a:t>2021-03-09</a:t>
             </a:fld>
             <a:endParaRPr lang="ko-KR" altLang="en-US"/>
           </a:p>
@@ -3076,326 +3079,11 @@
           <a:p>
             <a:r>
               <a:rPr lang="en-US" altLang="ko-KR" sz="3600" b="1" dirty="0"/>
-              <a:t>3. </a:t>
-            </a:r>
-            <a:r>
-              <a:rPr lang="en-US" altLang="ko-KR" sz="3600" b="1" dirty="0" smtClean="0"/>
-              <a:t>ARTSTATION (https://www.artstation.com)</a:t>
-            </a:r>
-            <a:endParaRPr lang="ko-KR" altLang="en-US" sz="3600" b="1" dirty="0"/>
-          </a:p>
-        </p:txBody>
-      </p:sp>
-      <p:pic>
-        <p:nvPicPr>
-          <p:cNvPr id="3" name="그림 2"/>
-          <p:cNvPicPr>
-            <a:picLocks noChangeAspect="1"/>
-          </p:cNvPicPr>
-          <p:nvPr/>
-        </p:nvPicPr>
-        <p:blipFill>
-          <a:blip r:embed="rId2"/>
-          <a:stretch>
-            <a:fillRect/>
-          </a:stretch>
-        </p:blipFill>
-        <p:spPr>
-          <a:xfrm>
-            <a:off x="1066799" y="1462088"/>
-            <a:ext cx="9762535" cy="4712418"/>
-          </a:xfrm>
-          <a:prstGeom prst="rect">
-            <a:avLst/>
-          </a:prstGeom>
-        </p:spPr>
-      </p:pic>
-    </p:spTree>
-    <p:extLst>
-      <p:ext uri="{BB962C8B-B14F-4D97-AF65-F5344CB8AC3E}">
-        <p14:creationId xmlns:p14="http://schemas.microsoft.com/office/powerpoint/2010/main" val="3041111274"/>
-      </p:ext>
-    </p:extLst>
-  </p:cSld>
-  <p:clrMapOvr>
-    <a:masterClrMapping/>
-  </p:clrMapOvr>
-</p:sld>
-</file>
-
-<file path=ppt/slides/slide11.xml><?xml version="1.0" encoding="utf-8"?>
-<p:sld xmlns:a="http://schemas.openxmlformats.org/drawingml/2006/main" xmlns:r="http://schemas.openxmlformats.org/officeDocument/2006/relationships" xmlns:p="http://schemas.openxmlformats.org/presentationml/2006/main">
-  <p:cSld>
-    <p:spTree>
-      <p:nvGrpSpPr>
-        <p:cNvPr id="1" name=""/>
-        <p:cNvGrpSpPr/>
-        <p:nvPr/>
-      </p:nvGrpSpPr>
-      <p:grpSpPr>
-        <a:xfrm>
-          <a:off x="0" y="0"/>
-          <a:ext cx="0" cy="0"/>
-          <a:chOff x="0" y="0"/>
-          <a:chExt cx="0" cy="0"/>
-        </a:xfrm>
-      </p:grpSpPr>
-      <p:sp>
-        <p:nvSpPr>
-          <p:cNvPr id="6" name="내용 개체 틀 2"/>
-          <p:cNvSpPr>
-            <a:spLocks noGrp="1"/>
-          </p:cNvSpPr>
-          <p:nvPr>
-            <p:ph idx="1"/>
-          </p:nvPr>
-        </p:nvSpPr>
-        <p:spPr>
-          <a:xfrm>
-            <a:off x="749300" y="508000"/>
-            <a:ext cx="10515600" cy="6045199"/>
-          </a:xfrm>
-        </p:spPr>
-        <p:txBody>
-          <a:bodyPr>
-            <a:normAutofit fontScale="85000" lnSpcReduction="10000"/>
-          </a:bodyPr>
-          <a:lstStyle/>
-          <a:p>
-            <a:pPr>
-              <a:lnSpc>
-                <a:spcPct val="220000"/>
-              </a:lnSpc>
-            </a:pPr>
-            <a:r>
-              <a:rPr lang="ko-KR" altLang="en-US" dirty="0" smtClean="0"/>
-              <a:t>항목 </a:t>
-            </a:r>
-            <a:r>
-              <a:rPr lang="en-US" altLang="ko-KR" dirty="0" smtClean="0"/>
-              <a:t>: </a:t>
-            </a:r>
-            <a:r>
-              <a:rPr lang="ko-KR" altLang="en-US" dirty="0" smtClean="0"/>
-              <a:t>일러스트</a:t>
-            </a:r>
-            <a:r>
-              <a:rPr lang="en-US" altLang="ko-KR" dirty="0" smtClean="0"/>
-              <a:t>, </a:t>
-            </a:r>
-            <a:r>
-              <a:rPr lang="ko-KR" altLang="en-US" dirty="0" smtClean="0"/>
-              <a:t>게임</a:t>
-            </a:r>
-            <a:r>
-              <a:rPr lang="en-US" altLang="ko-KR" dirty="0" smtClean="0"/>
-              <a:t>, </a:t>
-            </a:r>
-            <a:r>
-              <a:rPr lang="ko-KR" altLang="en-US" dirty="0" smtClean="0"/>
-              <a:t>디자인</a:t>
-            </a:r>
-            <a:r>
-              <a:rPr lang="en-US" altLang="ko-KR" dirty="0" smtClean="0"/>
-              <a:t>, 3d </a:t>
-            </a:r>
-            <a:r>
-              <a:rPr lang="ko-KR" altLang="en-US" dirty="0" smtClean="0"/>
-              <a:t>영상 음향</a:t>
-            </a:r>
-            <a:endParaRPr lang="en-US" altLang="ko-KR" dirty="0"/>
-          </a:p>
-          <a:p>
-            <a:pPr>
-              <a:lnSpc>
-                <a:spcPct val="220000"/>
-              </a:lnSpc>
-            </a:pPr>
-            <a:r>
-              <a:rPr lang="ko-KR" altLang="en-US" dirty="0" smtClean="0"/>
-              <a:t>특징 </a:t>
-            </a:r>
-            <a:r>
-              <a:rPr lang="en-US" altLang="ko-KR" dirty="0" smtClean="0"/>
-              <a:t>: </a:t>
-            </a:r>
-          </a:p>
-          <a:p>
-            <a:pPr lvl="1">
-              <a:lnSpc>
-                <a:spcPct val="220000"/>
-              </a:lnSpc>
-              <a:buFontTx/>
-              <a:buChar char="-"/>
-            </a:pPr>
-            <a:r>
-              <a:rPr lang="ko-KR" altLang="en-US" dirty="0" smtClean="0"/>
-              <a:t>외국 사이트</a:t>
-            </a:r>
-            <a:endParaRPr lang="en-US" altLang="ko-KR" dirty="0" smtClean="0"/>
-          </a:p>
-          <a:p>
-            <a:pPr lvl="1">
-              <a:lnSpc>
-                <a:spcPct val="220000"/>
-              </a:lnSpc>
-              <a:buFontTx/>
-              <a:buChar char="-"/>
-            </a:pPr>
-            <a:r>
-              <a:rPr lang="ko-KR" altLang="en-US" dirty="0" err="1" smtClean="0"/>
-              <a:t>팔로우</a:t>
-            </a:r>
-            <a:endParaRPr lang="en-US" altLang="ko-KR" dirty="0" smtClean="0"/>
-          </a:p>
-          <a:p>
-            <a:pPr lvl="1">
-              <a:lnSpc>
-                <a:spcPct val="220000"/>
-              </a:lnSpc>
-              <a:buFontTx/>
-              <a:buChar char="-"/>
-            </a:pPr>
-            <a:r>
-              <a:rPr lang="ko-KR" altLang="en-US" dirty="0" smtClean="0"/>
-              <a:t>커뮤니케이션</a:t>
-            </a:r>
-            <a:endParaRPr lang="en-US" altLang="ko-KR" dirty="0" smtClean="0"/>
-          </a:p>
-          <a:p>
-            <a:pPr lvl="1">
-              <a:lnSpc>
-                <a:spcPct val="220000"/>
-              </a:lnSpc>
-              <a:buFontTx/>
-              <a:buChar char="-"/>
-            </a:pPr>
-            <a:r>
-              <a:rPr lang="ko-KR" altLang="en-US" dirty="0" err="1" smtClean="0"/>
-              <a:t>반응형</a:t>
-            </a:r>
-            <a:r>
-              <a:rPr lang="ko-KR" altLang="en-US" dirty="0" smtClean="0"/>
-              <a:t> </a:t>
-            </a:r>
-            <a:r>
-              <a:rPr lang="ko-KR" altLang="en-US" dirty="0" err="1" smtClean="0"/>
-              <a:t>웹페이지</a:t>
-            </a:r>
-            <a:endParaRPr lang="en-US" altLang="ko-KR" dirty="0" smtClean="0"/>
-          </a:p>
-          <a:p>
-            <a:pPr lvl="1">
-              <a:lnSpc>
-                <a:spcPct val="220000"/>
-              </a:lnSpc>
-              <a:buFontTx/>
-              <a:buChar char="-"/>
-            </a:pPr>
-            <a:r>
-              <a:rPr lang="ko-KR" altLang="en-US" dirty="0" smtClean="0"/>
-              <a:t>애니메이션 </a:t>
-            </a:r>
-            <a:r>
-              <a:rPr lang="en-US" altLang="ko-KR" dirty="0" smtClean="0"/>
-              <a:t>x</a:t>
-            </a:r>
-          </a:p>
-          <a:p>
-            <a:pPr lvl="1">
-              <a:lnSpc>
-                <a:spcPct val="220000"/>
-              </a:lnSpc>
-              <a:buFontTx/>
-              <a:buChar char="-"/>
-            </a:pPr>
-            <a:r>
-              <a:rPr lang="ko-KR" altLang="en-US" dirty="0" smtClean="0"/>
-              <a:t>직업 모집</a:t>
-            </a:r>
-            <a:r>
-              <a:rPr lang="en-US" altLang="ko-KR" dirty="0" smtClean="0"/>
-              <a:t>, </a:t>
-            </a:r>
-            <a:r>
-              <a:rPr lang="ko-KR" altLang="en-US" dirty="0" err="1" smtClean="0"/>
-              <a:t>컨테스트</a:t>
-            </a:r>
-            <a:r>
-              <a:rPr lang="en-US" altLang="ko-KR" dirty="0" smtClean="0"/>
-              <a:t>, </a:t>
-            </a:r>
-            <a:r>
-              <a:rPr lang="ko-KR" altLang="en-US" dirty="0" smtClean="0"/>
-              <a:t>판매</a:t>
-            </a:r>
-            <a:r>
-              <a:rPr lang="en-US" altLang="ko-KR" dirty="0" smtClean="0"/>
-              <a:t> </a:t>
-            </a:r>
-            <a:r>
-              <a:rPr lang="ko-KR" altLang="en-US" dirty="0" smtClean="0"/>
-              <a:t>등</a:t>
-            </a:r>
-            <a:endParaRPr lang="en-US" altLang="ko-KR" dirty="0" smtClean="0"/>
-          </a:p>
-        </p:txBody>
-      </p:sp>
-    </p:spTree>
-    <p:extLst>
-      <p:ext uri="{BB962C8B-B14F-4D97-AF65-F5344CB8AC3E}">
-        <p14:creationId xmlns:p14="http://schemas.microsoft.com/office/powerpoint/2010/main" val="1322323572"/>
-      </p:ext>
-    </p:extLst>
-  </p:cSld>
-  <p:clrMapOvr>
-    <a:masterClrMapping/>
-  </p:clrMapOvr>
-</p:sld>
-</file>
-
-<file path=ppt/slides/slide12.xml><?xml version="1.0" encoding="utf-8"?>
-<p:sld xmlns:a="http://schemas.openxmlformats.org/drawingml/2006/main" xmlns:r="http://schemas.openxmlformats.org/officeDocument/2006/relationships" xmlns:p="http://schemas.openxmlformats.org/presentationml/2006/main">
-  <p:cSld>
-    <p:spTree>
-      <p:nvGrpSpPr>
-        <p:cNvPr id="1" name=""/>
-        <p:cNvGrpSpPr/>
-        <p:nvPr/>
-      </p:nvGrpSpPr>
-      <p:grpSpPr>
-        <a:xfrm>
-          <a:off x="0" y="0"/>
-          <a:ext cx="0" cy="0"/>
-          <a:chOff x="0" y="0"/>
-          <a:chExt cx="0" cy="0"/>
-        </a:xfrm>
-      </p:grpSpPr>
-      <p:sp>
-        <p:nvSpPr>
-          <p:cNvPr id="2" name="제목 1"/>
-          <p:cNvSpPr>
-            <a:spLocks noGrp="1"/>
-          </p:cNvSpPr>
-          <p:nvPr>
-            <p:ph type="title"/>
-          </p:nvPr>
-        </p:nvSpPr>
-        <p:spPr>
-          <a:xfrm>
-            <a:off x="301036" y="136525"/>
-            <a:ext cx="11040063" cy="1325563"/>
-          </a:xfrm>
-        </p:spPr>
-        <p:txBody>
-          <a:bodyPr>
-            <a:normAutofit/>
-          </a:bodyPr>
-          <a:lstStyle/>
-          <a:p>
-            <a:r>
-              <a:rPr lang="en-US" altLang="ko-KR" sz="3600" b="1" dirty="0"/>
-              <a:t>3. </a:t>
+              <a:t>5</a:t>
+            </a:r>
+            <a:r>
+              <a:rPr lang="en-US" altLang="ko-KR" sz="3600" b="1" smtClean="0"/>
+              <a:t>. </a:t>
             </a:r>
             <a:r>
               <a:rPr lang="en-US" altLang="ko-KR" sz="3600" b="1" dirty="0" err="1" smtClean="0"/>
@@ -3446,7 +3134,7 @@
 </p:sld>
 </file>
 
-<file path=ppt/slides/slide13.xml><?xml version="1.0" encoding="utf-8"?>
+<file path=ppt/slides/slide11.xml><?xml version="1.0" encoding="utf-8"?>
 <p:sld xmlns:a="http://schemas.openxmlformats.org/drawingml/2006/main" xmlns:r="http://schemas.openxmlformats.org/officeDocument/2006/relationships" xmlns:p="http://schemas.openxmlformats.org/presentationml/2006/main">
   <p:cSld>
     <p:spTree>
@@ -3718,366 +3406,6 @@
             </a:r>
             <a:r>
               <a:rPr lang="en-US" altLang="ko-KR" sz="3600" b="1" dirty="0" smtClean="0"/>
-              <a:t> (https:// - /)</a:t>
-            </a:r>
-            <a:endParaRPr lang="ko-KR" altLang="en-US" sz="3600" b="1" dirty="0"/>
-          </a:p>
-        </p:txBody>
-      </p:sp>
-    </p:spTree>
-    <p:extLst>
-      <p:ext uri="{BB962C8B-B14F-4D97-AF65-F5344CB8AC3E}">
-        <p14:creationId xmlns:p14="http://schemas.microsoft.com/office/powerpoint/2010/main" val="1692028564"/>
-      </p:ext>
-    </p:extLst>
-  </p:cSld>
-  <p:clrMapOvr>
-    <a:masterClrMapping/>
-  </p:clrMapOvr>
-</p:sld>
-</file>
-
-<file path=ppt/slides/slide3.xml><?xml version="1.0" encoding="utf-8"?>
-<p:sld xmlns:a="http://schemas.openxmlformats.org/drawingml/2006/main" xmlns:r="http://schemas.openxmlformats.org/officeDocument/2006/relationships" xmlns:p="http://schemas.openxmlformats.org/presentationml/2006/main">
-  <p:cSld>
-    <p:bg>
-      <p:bgPr>
-        <a:solidFill>
-          <a:schemeClr val="bg1">
-            <a:alpha val="78000"/>
-          </a:schemeClr>
-        </a:solidFill>
-        <a:effectLst/>
-      </p:bgPr>
-    </p:bg>
-    <p:spTree>
-      <p:nvGrpSpPr>
-        <p:cNvPr id="1" name=""/>
-        <p:cNvGrpSpPr/>
-        <p:nvPr/>
-      </p:nvGrpSpPr>
-      <p:grpSpPr>
-        <a:xfrm>
-          <a:off x="0" y="0"/>
-          <a:ext cx="0" cy="0"/>
-          <a:chOff x="0" y="0"/>
-          <a:chExt cx="0" cy="0"/>
-        </a:xfrm>
-      </p:grpSpPr>
-      <p:sp>
-        <p:nvSpPr>
-          <p:cNvPr id="3" name="내용 개체 틀 2"/>
-          <p:cNvSpPr>
-            <a:spLocks noGrp="1"/>
-          </p:cNvSpPr>
-          <p:nvPr>
-            <p:ph idx="1"/>
-          </p:nvPr>
-        </p:nvSpPr>
-        <p:spPr>
-          <a:xfrm>
-            <a:off x="749300" y="508000"/>
-            <a:ext cx="10515600" cy="6045199"/>
-          </a:xfrm>
-        </p:spPr>
-        <p:txBody>
-          <a:bodyPr>
-            <a:normAutofit fontScale="62500" lnSpcReduction="20000"/>
-          </a:bodyPr>
-          <a:lstStyle/>
-          <a:p>
-            <a:pPr>
-              <a:lnSpc>
-                <a:spcPct val="220000"/>
-              </a:lnSpc>
-            </a:pPr>
-            <a:r>
-              <a:rPr lang="ko-KR" altLang="en-US" dirty="0" smtClean="0"/>
-              <a:t>항목 </a:t>
-            </a:r>
-            <a:r>
-              <a:rPr lang="en-US" altLang="ko-KR" dirty="0" smtClean="0"/>
-              <a:t>: </a:t>
-            </a:r>
-            <a:r>
-              <a:rPr lang="ko-KR" altLang="en-US" dirty="0" smtClean="0"/>
-              <a:t>일러스트</a:t>
-            </a:r>
-            <a:r>
-              <a:rPr lang="en-US" altLang="ko-KR" dirty="0" smtClean="0"/>
-              <a:t>, </a:t>
-            </a:r>
-            <a:r>
-              <a:rPr lang="ko-KR" altLang="en-US" dirty="0" smtClean="0"/>
-              <a:t>만화</a:t>
-            </a:r>
-            <a:r>
-              <a:rPr lang="en-US" altLang="ko-KR" dirty="0" smtClean="0"/>
-              <a:t>, </a:t>
-            </a:r>
-            <a:r>
-              <a:rPr lang="ko-KR" altLang="en-US" dirty="0" smtClean="0"/>
-              <a:t>소설</a:t>
-            </a:r>
-            <a:endParaRPr lang="en-US" altLang="ko-KR" dirty="0" smtClean="0"/>
-          </a:p>
-          <a:p>
-            <a:pPr>
-              <a:lnSpc>
-                <a:spcPct val="220000"/>
-              </a:lnSpc>
-            </a:pPr>
-            <a:r>
-              <a:rPr lang="ko-KR" altLang="en-US" dirty="0" smtClean="0"/>
-              <a:t>특징 </a:t>
-            </a:r>
-            <a:r>
-              <a:rPr lang="en-US" altLang="ko-KR" dirty="0" smtClean="0"/>
-              <a:t>: </a:t>
-            </a:r>
-          </a:p>
-          <a:p>
-            <a:pPr lvl="1">
-              <a:lnSpc>
-                <a:spcPct val="220000"/>
-              </a:lnSpc>
-              <a:buFontTx/>
-              <a:buChar char="-"/>
-            </a:pPr>
-            <a:r>
-              <a:rPr lang="ko-KR" altLang="en-US" dirty="0" err="1" smtClean="0"/>
-              <a:t>팔로우</a:t>
-            </a:r>
-            <a:endParaRPr lang="en-US" altLang="ko-KR" dirty="0" smtClean="0"/>
-          </a:p>
-          <a:p>
-            <a:pPr lvl="1">
-              <a:lnSpc>
-                <a:spcPct val="220000"/>
-              </a:lnSpc>
-              <a:buFontTx/>
-              <a:buChar char="-"/>
-            </a:pPr>
-            <a:r>
-              <a:rPr lang="ko-KR" altLang="en-US" dirty="0" smtClean="0"/>
-              <a:t>커뮤니케이션</a:t>
-            </a:r>
-            <a:endParaRPr lang="en-US" altLang="ko-KR" dirty="0" smtClean="0"/>
-          </a:p>
-          <a:p>
-            <a:pPr lvl="1">
-              <a:lnSpc>
-                <a:spcPct val="220000"/>
-              </a:lnSpc>
-              <a:buFontTx/>
-              <a:buChar char="-"/>
-            </a:pPr>
-            <a:r>
-              <a:rPr lang="ko-KR" altLang="en-US" dirty="0" smtClean="0"/>
-              <a:t>일러스트</a:t>
-            </a:r>
-            <a:r>
-              <a:rPr lang="en-US" altLang="ko-KR" dirty="0" smtClean="0"/>
-              <a:t>, </a:t>
-            </a:r>
-            <a:r>
-              <a:rPr lang="ko-KR" altLang="en-US" dirty="0" smtClean="0"/>
-              <a:t>만화</a:t>
-            </a:r>
-            <a:r>
-              <a:rPr lang="en-US" altLang="ko-KR" dirty="0" smtClean="0"/>
-              <a:t>, </a:t>
-            </a:r>
-            <a:r>
-              <a:rPr lang="ko-KR" altLang="en-US" dirty="0" smtClean="0"/>
-              <a:t>소설 위주</a:t>
-            </a:r>
-            <a:endParaRPr lang="en-US" altLang="ko-KR" dirty="0" smtClean="0"/>
-          </a:p>
-          <a:p>
-            <a:pPr lvl="1">
-              <a:lnSpc>
-                <a:spcPct val="220000"/>
-              </a:lnSpc>
-              <a:buFontTx/>
-              <a:buChar char="-"/>
-            </a:pPr>
-            <a:r>
-              <a:rPr lang="ko-KR" altLang="en-US" dirty="0" smtClean="0"/>
-              <a:t>태그</a:t>
-            </a:r>
-            <a:endParaRPr lang="en-US" altLang="ko-KR" dirty="0" smtClean="0"/>
-          </a:p>
-          <a:p>
-            <a:pPr lvl="1">
-              <a:lnSpc>
-                <a:spcPct val="220000"/>
-              </a:lnSpc>
-              <a:buFontTx/>
-              <a:buChar char="-"/>
-            </a:pPr>
-            <a:r>
-              <a:rPr lang="ko-KR" altLang="en-US" dirty="0" smtClean="0"/>
-              <a:t>강의</a:t>
-            </a:r>
-            <a:endParaRPr lang="en-US" altLang="ko-KR" dirty="0" smtClean="0"/>
-          </a:p>
-          <a:p>
-            <a:pPr lvl="1">
-              <a:lnSpc>
-                <a:spcPct val="220000"/>
-              </a:lnSpc>
-              <a:buFontTx/>
-              <a:buChar char="-"/>
-            </a:pPr>
-            <a:r>
-              <a:rPr lang="ko-KR" altLang="en-US" dirty="0" smtClean="0"/>
-              <a:t>심플함</a:t>
-            </a:r>
-            <a:endParaRPr lang="en-US" altLang="ko-KR" dirty="0" smtClean="0"/>
-          </a:p>
-          <a:p>
-            <a:pPr lvl="1">
-              <a:lnSpc>
-                <a:spcPct val="220000"/>
-              </a:lnSpc>
-              <a:buFontTx/>
-              <a:buChar char="-"/>
-            </a:pPr>
-            <a:r>
-              <a:rPr lang="ko-KR" altLang="en-US" dirty="0" err="1" smtClean="0"/>
-              <a:t>반응형</a:t>
-            </a:r>
-            <a:r>
-              <a:rPr lang="ko-KR" altLang="en-US" dirty="0" smtClean="0"/>
-              <a:t> </a:t>
-            </a:r>
-            <a:r>
-              <a:rPr lang="ko-KR" altLang="en-US" dirty="0" err="1" smtClean="0"/>
-              <a:t>웹페이지</a:t>
-            </a:r>
-            <a:r>
-              <a:rPr lang="ko-KR" altLang="en-US" dirty="0" smtClean="0"/>
-              <a:t> </a:t>
-            </a:r>
-            <a:r>
-              <a:rPr lang="en-US" altLang="ko-KR" dirty="0" smtClean="0"/>
-              <a:t>x,</a:t>
-            </a:r>
-          </a:p>
-          <a:p>
-            <a:pPr lvl="1">
-              <a:lnSpc>
-                <a:spcPct val="220000"/>
-              </a:lnSpc>
-              <a:buFontTx/>
-              <a:buChar char="-"/>
-            </a:pPr>
-            <a:r>
-              <a:rPr lang="ko-KR" altLang="en-US" dirty="0" smtClean="0"/>
-              <a:t>애니메이션 </a:t>
-            </a:r>
-            <a:r>
-              <a:rPr lang="en-US" altLang="ko-KR" dirty="0" smtClean="0"/>
-              <a:t>x</a:t>
-            </a:r>
-          </a:p>
-          <a:p>
-            <a:pPr lvl="1">
-              <a:lnSpc>
-                <a:spcPct val="220000"/>
-              </a:lnSpc>
-              <a:buFontTx/>
-              <a:buChar char="-"/>
-            </a:pPr>
-            <a:r>
-              <a:rPr lang="ko-KR" altLang="en-US" dirty="0" smtClean="0"/>
-              <a:t>매일 올라오는 </a:t>
-            </a:r>
-            <a:r>
-              <a:rPr lang="ko-KR" altLang="en-US" dirty="0" err="1" smtClean="0"/>
-              <a:t>게시글을</a:t>
-            </a:r>
-            <a:r>
-              <a:rPr lang="ko-KR" altLang="en-US" dirty="0" smtClean="0"/>
-              <a:t> 볼 수 있음</a:t>
-            </a:r>
-            <a:endParaRPr lang="en-US" altLang="ko-KR" dirty="0" smtClean="0"/>
-          </a:p>
-        </p:txBody>
-      </p:sp>
-    </p:spTree>
-    <p:extLst>
-      <p:ext uri="{BB962C8B-B14F-4D97-AF65-F5344CB8AC3E}">
-        <p14:creationId xmlns:p14="http://schemas.microsoft.com/office/powerpoint/2010/main" val="3423057892"/>
-      </p:ext>
-    </p:extLst>
-  </p:cSld>
-  <p:clrMapOvr>
-    <a:masterClrMapping/>
-  </p:clrMapOvr>
-</p:sld>
-</file>
-
-<file path=ppt/slides/slide4.xml><?xml version="1.0" encoding="utf-8"?>
-<p:sld xmlns:a="http://schemas.openxmlformats.org/drawingml/2006/main" xmlns:r="http://schemas.openxmlformats.org/officeDocument/2006/relationships" xmlns:p="http://schemas.openxmlformats.org/presentationml/2006/main">
-  <p:cSld>
-    <p:bg>
-      <p:bgPr>
-        <a:solidFill>
-          <a:schemeClr val="bg1">
-            <a:alpha val="78000"/>
-          </a:schemeClr>
-        </a:solidFill>
-        <a:effectLst/>
-      </p:bgPr>
-    </p:bg>
-    <p:spTree>
-      <p:nvGrpSpPr>
-        <p:cNvPr id="1" name=""/>
-        <p:cNvGrpSpPr/>
-        <p:nvPr/>
-      </p:nvGrpSpPr>
-      <p:grpSpPr>
-        <a:xfrm>
-          <a:off x="0" y="0"/>
-          <a:ext cx="0" cy="0"/>
-          <a:chOff x="0" y="0"/>
-          <a:chExt cx="0" cy="0"/>
-        </a:xfrm>
-      </p:grpSpPr>
-      <p:sp>
-        <p:nvSpPr>
-          <p:cNvPr id="2" name="제목 1"/>
-          <p:cNvSpPr>
-            <a:spLocks noGrp="1"/>
-          </p:cNvSpPr>
-          <p:nvPr>
-            <p:ph type="title"/>
-          </p:nvPr>
-        </p:nvSpPr>
-        <p:spPr>
-          <a:xfrm>
-            <a:off x="266700" y="88900"/>
-            <a:ext cx="10515600" cy="1325563"/>
-          </a:xfrm>
-        </p:spPr>
-        <p:txBody>
-          <a:bodyPr>
-            <a:normAutofit/>
-          </a:bodyPr>
-          <a:lstStyle/>
-          <a:p>
-            <a:r>
-              <a:rPr lang="en-US" altLang="ko-KR" sz="3600" b="1" dirty="0" smtClean="0"/>
-              <a:t>1. </a:t>
-            </a:r>
-            <a:r>
-              <a:rPr lang="en-US" altLang="ko-KR" sz="3600" b="1" dirty="0" err="1" smtClean="0"/>
-              <a:t>Pixiv</a:t>
-            </a:r>
-            <a:r>
-              <a:rPr lang="en-US" altLang="ko-KR" sz="3600" b="1" dirty="0" smtClean="0"/>
               <a:t> (https://www.pixiv.net/)</a:t>
             </a:r>
             <a:endParaRPr lang="ko-KR" altLang="en-US" sz="3600" b="1" dirty="0"/>
@@ -4121,7 +3449,7 @@
 </p:sld>
 </file>
 
-<file path=ppt/slides/slide5.xml><?xml version="1.0" encoding="utf-8"?>
+<file path=ppt/slides/slide3.xml><?xml version="1.0" encoding="utf-8"?>
 <p:sld xmlns:a="http://schemas.openxmlformats.org/drawingml/2006/main" xmlns:r="http://schemas.openxmlformats.org/officeDocument/2006/relationships" xmlns:p="http://schemas.openxmlformats.org/presentationml/2006/main">
   <p:cSld>
     <p:bg>
@@ -4403,7 +3731,7 @@
 </p:sld>
 </file>
 
-<file path=ppt/slides/slide6.xml><?xml version="1.0" encoding="utf-8"?>
+<file path=ppt/slides/slide4.xml><?xml version="1.0" encoding="utf-8"?>
 <p:sld xmlns:a="http://schemas.openxmlformats.org/drawingml/2006/main" xmlns:r="http://schemas.openxmlformats.org/officeDocument/2006/relationships" xmlns:p="http://schemas.openxmlformats.org/presentationml/2006/main">
   <p:cSld>
     <p:spTree>
@@ -4495,7 +3823,7 @@
 </p:sld>
 </file>
 
-<file path=ppt/slides/slide7.xml><?xml version="1.0" encoding="utf-8"?>
+<file path=ppt/slides/slide5.xml><?xml version="1.0" encoding="utf-8"?>
 <p:sld xmlns:a="http://schemas.openxmlformats.org/drawingml/2006/main" xmlns:r="http://schemas.openxmlformats.org/officeDocument/2006/relationships" xmlns:p="http://schemas.openxmlformats.org/presentationml/2006/main">
   <p:cSld>
     <p:spTree>
@@ -4771,7 +4099,7 @@
 </p:sld>
 </file>
 
-<file path=ppt/slides/slide8.xml><?xml version="1.0" encoding="utf-8"?>
+<file path=ppt/slides/slide6.xml><?xml version="1.0" encoding="utf-8"?>
 <p:sld xmlns:a="http://schemas.openxmlformats.org/drawingml/2006/main" xmlns:r="http://schemas.openxmlformats.org/officeDocument/2006/relationships" xmlns:p="http://schemas.openxmlformats.org/presentationml/2006/main">
   <p:cSld>
     <p:spTree>
@@ -4863,6 +4191,343 @@
 </p:sld>
 </file>
 
+<file path=ppt/slides/slide7.xml><?xml version="1.0" encoding="utf-8"?>
+<p:sld xmlns:a="http://schemas.openxmlformats.org/drawingml/2006/main" xmlns:r="http://schemas.openxmlformats.org/officeDocument/2006/relationships" xmlns:p="http://schemas.openxmlformats.org/presentationml/2006/main">
+  <p:cSld>
+    <p:spTree>
+      <p:nvGrpSpPr>
+        <p:cNvPr id="1" name=""/>
+        <p:cNvGrpSpPr/>
+        <p:nvPr/>
+      </p:nvGrpSpPr>
+      <p:grpSpPr>
+        <a:xfrm>
+          <a:off x="0" y="0"/>
+          <a:ext cx="0" cy="0"/>
+          <a:chOff x="0" y="0"/>
+          <a:chExt cx="0" cy="0"/>
+        </a:xfrm>
+      </p:grpSpPr>
+      <p:sp>
+        <p:nvSpPr>
+          <p:cNvPr id="6" name="내용 개체 틀 2"/>
+          <p:cNvSpPr>
+            <a:spLocks noGrp="1"/>
+          </p:cNvSpPr>
+          <p:nvPr>
+            <p:ph idx="1"/>
+          </p:nvPr>
+        </p:nvSpPr>
+        <p:spPr>
+          <a:xfrm>
+            <a:off x="749300" y="508000"/>
+            <a:ext cx="10515600" cy="6045199"/>
+          </a:xfrm>
+        </p:spPr>
+        <p:txBody>
+          <a:bodyPr>
+            <a:normAutofit fontScale="85000" lnSpcReduction="10000"/>
+          </a:bodyPr>
+          <a:lstStyle/>
+          <a:p>
+            <a:pPr>
+              <a:lnSpc>
+                <a:spcPct val="220000"/>
+              </a:lnSpc>
+            </a:pPr>
+            <a:r>
+              <a:rPr lang="ko-KR" altLang="en-US" dirty="0" smtClean="0"/>
+              <a:t>항목 </a:t>
+            </a:r>
+            <a:r>
+              <a:rPr lang="en-US" altLang="ko-KR" dirty="0" smtClean="0"/>
+              <a:t>: </a:t>
+            </a:r>
+            <a:r>
+              <a:rPr lang="ko-KR" altLang="en-US" dirty="0" smtClean="0"/>
+              <a:t>일러스트</a:t>
+            </a:r>
+            <a:r>
+              <a:rPr lang="en-US" altLang="ko-KR" dirty="0" smtClean="0"/>
+              <a:t>, </a:t>
+            </a:r>
+            <a:r>
+              <a:rPr lang="ko-KR" altLang="en-US" dirty="0" smtClean="0"/>
+              <a:t>웹툰</a:t>
+            </a:r>
+            <a:r>
+              <a:rPr lang="en-US" altLang="ko-KR" dirty="0" smtClean="0"/>
+              <a:t>, </a:t>
+            </a:r>
+            <a:r>
+              <a:rPr lang="ko-KR" altLang="en-US" dirty="0" smtClean="0"/>
+              <a:t>디자인</a:t>
+            </a:r>
+            <a:r>
+              <a:rPr lang="en-US" altLang="ko-KR" dirty="0" smtClean="0"/>
+              <a:t>, </a:t>
+            </a:r>
+            <a:r>
+              <a:rPr lang="ko-KR" altLang="en-US" dirty="0" smtClean="0"/>
+              <a:t>영상 음향</a:t>
+            </a:r>
+            <a:r>
+              <a:rPr lang="en-US" altLang="ko-KR" dirty="0" smtClean="0"/>
+              <a:t>, </a:t>
+            </a:r>
+            <a:r>
+              <a:rPr lang="ko-KR" altLang="en-US" dirty="0" smtClean="0"/>
+              <a:t>소설 외주</a:t>
+            </a:r>
+            <a:endParaRPr lang="en-US" altLang="ko-KR" dirty="0" smtClean="0"/>
+          </a:p>
+          <a:p>
+            <a:pPr>
+              <a:lnSpc>
+                <a:spcPct val="220000"/>
+              </a:lnSpc>
+            </a:pPr>
+            <a:r>
+              <a:rPr lang="ko-KR" altLang="en-US" dirty="0" smtClean="0"/>
+              <a:t>특징 </a:t>
+            </a:r>
+            <a:r>
+              <a:rPr lang="en-US" altLang="ko-KR" dirty="0" smtClean="0"/>
+              <a:t>: </a:t>
+            </a:r>
+          </a:p>
+          <a:p>
+            <a:pPr lvl="1">
+              <a:lnSpc>
+                <a:spcPct val="220000"/>
+              </a:lnSpc>
+              <a:buFontTx/>
+              <a:buChar char="-"/>
+            </a:pPr>
+            <a:r>
+              <a:rPr lang="ko-KR" altLang="en-US" dirty="0" smtClean="0"/>
+              <a:t>외주 형식</a:t>
+            </a:r>
+            <a:endParaRPr lang="en-US" altLang="ko-KR" dirty="0" smtClean="0"/>
+          </a:p>
+          <a:p>
+            <a:pPr lvl="1">
+              <a:lnSpc>
+                <a:spcPct val="220000"/>
+              </a:lnSpc>
+              <a:buFontTx/>
+              <a:buChar char="-"/>
+            </a:pPr>
+            <a:r>
+              <a:rPr lang="ko-KR" altLang="en-US" dirty="0" smtClean="0"/>
+              <a:t>상업용</a:t>
+            </a:r>
+            <a:r>
+              <a:rPr lang="en-US" altLang="ko-KR" dirty="0" smtClean="0"/>
+              <a:t>, </a:t>
+            </a:r>
+            <a:r>
+              <a:rPr lang="ko-KR" altLang="en-US" dirty="0" err="1" smtClean="0"/>
+              <a:t>비상업용</a:t>
+            </a:r>
+            <a:r>
+              <a:rPr lang="en-US" altLang="ko-KR" dirty="0"/>
+              <a:t> </a:t>
+            </a:r>
+            <a:r>
+              <a:rPr lang="ko-KR" altLang="en-US" dirty="0" smtClean="0"/>
+              <a:t>등 다양한 타입의 외주 형식을 요청할 수 있다</a:t>
+            </a:r>
+            <a:r>
+              <a:rPr lang="en-US" altLang="ko-KR" dirty="0" smtClean="0"/>
+              <a:t>.</a:t>
+            </a:r>
+          </a:p>
+          <a:p>
+            <a:pPr lvl="1">
+              <a:lnSpc>
+                <a:spcPct val="220000"/>
+              </a:lnSpc>
+              <a:buFontTx/>
+              <a:buChar char="-"/>
+            </a:pPr>
+            <a:r>
+              <a:rPr lang="ko-KR" altLang="en-US" dirty="0" smtClean="0"/>
+              <a:t>상업적인 페이지</a:t>
+            </a:r>
+            <a:endParaRPr lang="en-US" altLang="ko-KR" dirty="0" smtClean="0"/>
+          </a:p>
+          <a:p>
+            <a:pPr lvl="1">
+              <a:lnSpc>
+                <a:spcPct val="220000"/>
+              </a:lnSpc>
+              <a:buFontTx/>
+              <a:buChar char="-"/>
+            </a:pPr>
+            <a:r>
+              <a:rPr lang="ko-KR" altLang="en-US" dirty="0" err="1" smtClean="0"/>
+              <a:t>반응형</a:t>
+            </a:r>
+            <a:r>
+              <a:rPr lang="ko-KR" altLang="en-US" dirty="0" smtClean="0"/>
+              <a:t> </a:t>
+            </a:r>
+            <a:r>
+              <a:rPr lang="ko-KR" altLang="en-US" dirty="0" err="1" smtClean="0"/>
+              <a:t>웹페이지</a:t>
+            </a:r>
+            <a:r>
+              <a:rPr lang="ko-KR" altLang="en-US" dirty="0" smtClean="0"/>
+              <a:t> </a:t>
+            </a:r>
+            <a:r>
+              <a:rPr lang="en-US" altLang="ko-KR" dirty="0" smtClean="0"/>
+              <a:t>x</a:t>
+            </a:r>
+          </a:p>
+          <a:p>
+            <a:pPr lvl="1">
+              <a:lnSpc>
+                <a:spcPct val="220000"/>
+              </a:lnSpc>
+              <a:buFontTx/>
+              <a:buChar char="-"/>
+            </a:pPr>
+            <a:r>
+              <a:rPr lang="ko-KR" altLang="en-US" dirty="0" smtClean="0"/>
+              <a:t>애니메이션 </a:t>
+            </a:r>
+            <a:r>
+              <a:rPr lang="en-US" altLang="ko-KR" dirty="0" smtClean="0"/>
+              <a:t>x</a:t>
+            </a:r>
+          </a:p>
+          <a:p>
+            <a:pPr lvl="1">
+              <a:lnSpc>
+                <a:spcPct val="220000"/>
+              </a:lnSpc>
+              <a:buFontTx/>
+              <a:buChar char="-"/>
+            </a:pPr>
+            <a:r>
+              <a:rPr lang="en-US" altLang="ko-KR" dirty="0"/>
+              <a:t> </a:t>
+            </a:r>
+            <a:r>
+              <a:rPr lang="ko-KR" altLang="en-US" dirty="0" smtClean="0"/>
+              <a:t>사업적인 목적이 아니면 접근성이 낮음</a:t>
+            </a:r>
+            <a:endParaRPr lang="en-US" altLang="ko-KR" dirty="0" smtClean="0"/>
+          </a:p>
+        </p:txBody>
+      </p:sp>
+    </p:spTree>
+    <p:extLst>
+      <p:ext uri="{BB962C8B-B14F-4D97-AF65-F5344CB8AC3E}">
+        <p14:creationId xmlns:p14="http://schemas.microsoft.com/office/powerpoint/2010/main" val="3393880174"/>
+      </p:ext>
+    </p:extLst>
+  </p:cSld>
+  <p:clrMapOvr>
+    <a:masterClrMapping/>
+  </p:clrMapOvr>
+</p:sld>
+</file>
+
+<file path=ppt/slides/slide8.xml><?xml version="1.0" encoding="utf-8"?>
+<p:sld xmlns:a="http://schemas.openxmlformats.org/drawingml/2006/main" xmlns:r="http://schemas.openxmlformats.org/officeDocument/2006/relationships" xmlns:p="http://schemas.openxmlformats.org/presentationml/2006/main">
+  <p:cSld>
+    <p:spTree>
+      <p:nvGrpSpPr>
+        <p:cNvPr id="1" name=""/>
+        <p:cNvGrpSpPr/>
+        <p:nvPr/>
+      </p:nvGrpSpPr>
+      <p:grpSpPr>
+        <a:xfrm>
+          <a:off x="0" y="0"/>
+          <a:ext cx="0" cy="0"/>
+          <a:chOff x="0" y="0"/>
+          <a:chExt cx="0" cy="0"/>
+        </a:xfrm>
+      </p:grpSpPr>
+      <p:sp>
+        <p:nvSpPr>
+          <p:cNvPr id="2" name="제목 1"/>
+          <p:cNvSpPr>
+            <a:spLocks noGrp="1"/>
+          </p:cNvSpPr>
+          <p:nvPr>
+            <p:ph type="title"/>
+          </p:nvPr>
+        </p:nvSpPr>
+        <p:spPr>
+          <a:xfrm>
+            <a:off x="301036" y="136525"/>
+            <a:ext cx="11040063" cy="1325563"/>
+          </a:xfrm>
+        </p:spPr>
+        <p:txBody>
+          <a:bodyPr>
+            <a:normAutofit/>
+          </a:bodyPr>
+          <a:lstStyle/>
+          <a:p>
+            <a:r>
+              <a:rPr lang="en-US" altLang="ko-KR" sz="3600" b="1" dirty="0"/>
+              <a:t>4</a:t>
+            </a:r>
+            <a:r>
+              <a:rPr lang="en-US" altLang="ko-KR" sz="3600" b="1" smtClean="0"/>
+              <a:t>. </a:t>
+            </a:r>
+            <a:r>
+              <a:rPr lang="en-US" altLang="ko-KR" sz="3600" b="1" dirty="0" smtClean="0"/>
+              <a:t>ARTSTATION (https://www.artstation.com)</a:t>
+            </a:r>
+            <a:endParaRPr lang="ko-KR" altLang="en-US" sz="3600" b="1" dirty="0"/>
+          </a:p>
+        </p:txBody>
+      </p:sp>
+      <p:pic>
+        <p:nvPicPr>
+          <p:cNvPr id="3" name="그림 2"/>
+          <p:cNvPicPr>
+            <a:picLocks noChangeAspect="1"/>
+          </p:cNvPicPr>
+          <p:nvPr/>
+        </p:nvPicPr>
+        <p:blipFill>
+          <a:blip r:embed="rId2"/>
+          <a:stretch>
+            <a:fillRect/>
+          </a:stretch>
+        </p:blipFill>
+        <p:spPr>
+          <a:xfrm>
+            <a:off x="1066799" y="1462088"/>
+            <a:ext cx="9762535" cy="4712418"/>
+          </a:xfrm>
+          <a:prstGeom prst="rect">
+            <a:avLst/>
+          </a:prstGeom>
+        </p:spPr>
+      </p:pic>
+    </p:spTree>
+    <p:extLst>
+      <p:ext uri="{BB962C8B-B14F-4D97-AF65-F5344CB8AC3E}">
+        <p14:creationId xmlns:p14="http://schemas.microsoft.com/office/powerpoint/2010/main" val="3041111274"/>
+      </p:ext>
+    </p:extLst>
+  </p:cSld>
+  <p:clrMapOvr>
+    <a:masterClrMapping/>
+  </p:clrMapOvr>
+</p:sld>
+</file>
+
 <file path=ppt/slides/slide9.xml><?xml version="1.0" encoding="utf-8"?>
 <p:sld xmlns:a="http://schemas.openxmlformats.org/drawingml/2006/main" xmlns:r="http://schemas.openxmlformats.org/officeDocument/2006/relationships" xmlns:p="http://schemas.openxmlformats.org/presentationml/2006/main">
   <p:cSld>
@@ -4925,7 +4590,7 @@
             </a:r>
             <a:r>
               <a:rPr lang="ko-KR" altLang="en-US" dirty="0" smtClean="0"/>
-              <a:t>웹툰</a:t>
+              <a:t>게임</a:t>
             </a:r>
             <a:r>
               <a:rPr lang="en-US" altLang="ko-KR" dirty="0" smtClean="0"/>
@@ -4937,21 +4602,13 @@
             </a:r>
             <a:r>
               <a:rPr lang="en-US" altLang="ko-KR" dirty="0" smtClean="0"/>
-              <a:t>, </a:t>
+              <a:t>, 3d </a:t>
             </a:r>
             <a:r>
               <a:rPr lang="ko-KR" altLang="en-US" dirty="0" smtClean="0"/>
               <a:t>영상 음향</a:t>
             </a:r>
-            <a:r>
-              <a:rPr lang="en-US" altLang="ko-KR" dirty="0" smtClean="0"/>
-              <a:t>, </a:t>
-            </a:r>
-            <a:r>
-              <a:rPr lang="ko-KR" altLang="en-US" dirty="0" smtClean="0"/>
-              <a:t>소설 외주</a:t>
-            </a:r>
-            <a:endParaRPr lang="en-US" altLang="ko-KR" dirty="0" smtClean="0"/>
+            <a:endParaRPr lang="en-US" altLang="ko-KR" dirty="0"/>
           </a:p>
           <a:p>
             <a:pPr>
@@ -4978,7 +4635,7 @@
             </a:pPr>
             <a:r>
               <a:rPr lang="ko-KR" altLang="en-US" dirty="0" smtClean="0"/>
-              <a:t>외주 형식</a:t>
+              <a:t>외국 사이트</a:t>
             </a:r>
             <a:endParaRPr lang="en-US" altLang="ko-KR" dirty="0" smtClean="0"/>
           </a:p>
@@ -4991,29 +4648,10 @@
               <a:buChar char="-"/>
             </a:pPr>
             <a:r>
-              <a:rPr lang="ko-KR" altLang="en-US" dirty="0" smtClean="0"/>
-              <a:t>상업용</a:t>
-            </a:r>
-            <a:r>
-              <a:rPr lang="en-US" altLang="ko-KR" dirty="0" smtClean="0"/>
-              <a:t>, </a:t>
-            </a:r>
-            <a:r>
               <a:rPr lang="ko-KR" altLang="en-US" dirty="0" err="1" smtClean="0"/>
-              <a:t>비상업용</a:t>
-            </a:r>
-            <a:r>
-              <a:rPr lang="en-US" altLang="ko-KR" dirty="0"/>
-              <a:t> </a:t>
-            </a:r>
-            <a:r>
-              <a:rPr lang="ko-KR" altLang="en-US" dirty="0" smtClean="0"/>
-              <a:t>등 다양한 타입의 외주 형식을 요청할 수 있다</a:t>
-            </a:r>
-            <a:r>
-              <a:rPr lang="en-US" altLang="ko-KR" dirty="0" smtClean="0"/>
-              <a:t>.</a:t>
-            </a:r>
+              <a:t>팔로우</a:t>
+            </a:r>
+            <a:endParaRPr lang="en-US" altLang="ko-KR" dirty="0" smtClean="0"/>
           </a:p>
           <a:p>
             <a:pPr lvl="1">
@@ -5025,7 +4663,7 @@
             </a:pPr>
             <a:r>
               <a:rPr lang="ko-KR" altLang="en-US" dirty="0" smtClean="0"/>
-              <a:t>상업적인 페이지</a:t>
+              <a:t>커뮤니케이션</a:t>
             </a:r>
             <a:endParaRPr lang="en-US" altLang="ko-KR" dirty="0" smtClean="0"/>
           </a:p>
@@ -5049,14 +4687,7 @@
               <a:rPr lang="ko-KR" altLang="en-US" dirty="0" err="1" smtClean="0"/>
               <a:t>웹페이지</a:t>
             </a:r>
-            <a:r>
-              <a:rPr lang="ko-KR" altLang="en-US" dirty="0" smtClean="0"/>
-              <a:t> </a:t>
-            </a:r>
-            <a:r>
-              <a:rPr lang="en-US" altLang="ko-KR" dirty="0" smtClean="0"/>
-              <a:t>x</a:t>
-            </a:r>
+            <a:endParaRPr lang="en-US" altLang="ko-KR" dirty="0" smtClean="0"/>
           </a:p>
           <a:p>
             <a:pPr lvl="1">
@@ -5084,12 +4715,32 @@
               <a:buChar char="-"/>
             </a:pPr>
             <a:r>
-              <a:rPr lang="en-US" altLang="ko-KR" dirty="0"/>
+              <a:rPr lang="ko-KR" altLang="en-US" dirty="0" smtClean="0"/>
+              <a:t>직업 모집</a:t>
+            </a:r>
+            <a:r>
+              <a:rPr lang="en-US" altLang="ko-KR" dirty="0" smtClean="0"/>
+              <a:t>, </a:t>
+            </a:r>
+            <a:r>
+              <a:rPr lang="ko-KR" altLang="en-US" dirty="0" err="1" smtClean="0"/>
+              <a:t>컨테스트</a:t>
+            </a:r>
+            <a:r>
+              <a:rPr lang="en-US" altLang="ko-KR" dirty="0" smtClean="0"/>
+              <a:t>, </a:t>
+            </a:r>
+            <a:r>
+              <a:rPr lang="ko-KR" altLang="en-US" dirty="0" smtClean="0"/>
+              <a:t>판매</a:t>
+            </a:r>
+            <a:r>
+              <a:rPr lang="en-US" altLang="ko-KR" dirty="0" smtClean="0"/>
               <a:t> </a:t>
             </a:r>
             <a:r>
               <a:rPr lang="ko-KR" altLang="en-US" dirty="0" smtClean="0"/>
-              <a:t>사업적인 목적이 아니면 접근성이 낮음</a:t>
+              <a:t>등</a:t>
             </a:r>
             <a:endParaRPr lang="en-US" altLang="ko-KR" dirty="0" smtClean="0"/>
           </a:p>
@@ -5098,7 +4749,7 @@
     </p:spTree>
     <p:extLst>
       <p:ext uri="{BB962C8B-B14F-4D97-AF65-F5344CB8AC3E}">
-        <p14:creationId xmlns:p14="http://schemas.microsoft.com/office/powerpoint/2010/main" val="3393880174"/>
+        <p14:creationId xmlns:p14="http://schemas.microsoft.com/office/powerpoint/2010/main" val="1322323572"/>
       </p:ext>
     </p:extLst>
   </p:cSld>

</xml_diff>